<commit_message>
load testing tools in Optimize Web Servers.ppt
</commit_message>
<xml_diff>
--- a/Aario-PPT/IT/3. Optimize Web Servers.pptx
+++ b/Aario-PPT/IT/3. Optimize Web Servers.pptx
@@ -7,13 +7,14 @@
   <p:sldIdLst>
     <p:sldId id="256" r:id="rId2"/>
     <p:sldId id="257" r:id="rId3"/>
-    <p:sldId id="261" r:id="rId4"/>
-    <p:sldId id="259" r:id="rId5"/>
-    <p:sldId id="258" r:id="rId6"/>
-    <p:sldId id="262" r:id="rId7"/>
-    <p:sldId id="264" r:id="rId8"/>
-    <p:sldId id="265" r:id="rId9"/>
-    <p:sldId id="260" r:id="rId10"/>
+    <p:sldId id="266" r:id="rId4"/>
+    <p:sldId id="261" r:id="rId5"/>
+    <p:sldId id="259" r:id="rId6"/>
+    <p:sldId id="258" r:id="rId7"/>
+    <p:sldId id="262" r:id="rId8"/>
+    <p:sldId id="264" r:id="rId9"/>
+    <p:sldId id="265" r:id="rId10"/>
+    <p:sldId id="260" r:id="rId11"/>
   </p:sldIdLst>
   <p:sldSz cx="9144000" cy="6858000" type="screen4x3"/>
   <p:notesSz cx="6858000" cy="9144000"/>
@@ -296,7 +297,7 @@
           <a:p>
             <a:fld id="{530820CF-B880-4189-942D-D702A7CBA730}" type="datetimeFigureOut">
               <a:rPr lang="zh-CN" altLang="en-US" smtClean="0"/>
-              <a:t>2016/7/29</a:t>
+              <a:t>2016/7/30</a:t>
             </a:fld>
             <a:endParaRPr lang="zh-CN" altLang="en-US"/>
           </a:p>
@@ -461,7 +462,7 @@
           <a:p>
             <a:fld id="{530820CF-B880-4189-942D-D702A7CBA730}" type="datetimeFigureOut">
               <a:rPr lang="zh-CN" altLang="en-US" smtClean="0"/>
-              <a:t>2016/7/29</a:t>
+              <a:t>2016/7/30</a:t>
             </a:fld>
             <a:endParaRPr lang="zh-CN" altLang="en-US"/>
           </a:p>
@@ -636,7 +637,7 @@
           <a:p>
             <a:fld id="{530820CF-B880-4189-942D-D702A7CBA730}" type="datetimeFigureOut">
               <a:rPr lang="zh-CN" altLang="en-US" smtClean="0"/>
-              <a:t>2016/7/29</a:t>
+              <a:t>2016/7/30</a:t>
             </a:fld>
             <a:endParaRPr lang="zh-CN" altLang="en-US"/>
           </a:p>
@@ -801,7 +802,7 @@
           <a:p>
             <a:fld id="{530820CF-B880-4189-942D-D702A7CBA730}" type="datetimeFigureOut">
               <a:rPr lang="zh-CN" altLang="en-US" smtClean="0"/>
-              <a:t>2016/7/29</a:t>
+              <a:t>2016/7/30</a:t>
             </a:fld>
             <a:endParaRPr lang="zh-CN" altLang="en-US"/>
           </a:p>
@@ -1042,7 +1043,7 @@
           <a:p>
             <a:fld id="{530820CF-B880-4189-942D-D702A7CBA730}" type="datetimeFigureOut">
               <a:rPr lang="zh-CN" altLang="en-US" smtClean="0"/>
-              <a:t>2016/7/29</a:t>
+              <a:t>2016/7/30</a:t>
             </a:fld>
             <a:endParaRPr lang="zh-CN" altLang="en-US"/>
           </a:p>
@@ -1325,7 +1326,7 @@
           <a:p>
             <a:fld id="{530820CF-B880-4189-942D-D702A7CBA730}" type="datetimeFigureOut">
               <a:rPr lang="zh-CN" altLang="en-US" smtClean="0"/>
-              <a:t>2016/7/29</a:t>
+              <a:t>2016/7/30</a:t>
             </a:fld>
             <a:endParaRPr lang="zh-CN" altLang="en-US"/>
           </a:p>
@@ -1742,7 +1743,7 @@
           <a:p>
             <a:fld id="{530820CF-B880-4189-942D-D702A7CBA730}" type="datetimeFigureOut">
               <a:rPr lang="zh-CN" altLang="en-US" smtClean="0"/>
-              <a:t>2016/7/29</a:t>
+              <a:t>2016/7/30</a:t>
             </a:fld>
             <a:endParaRPr lang="zh-CN" altLang="en-US"/>
           </a:p>
@@ -1855,7 +1856,7 @@
           <a:p>
             <a:fld id="{530820CF-B880-4189-942D-D702A7CBA730}" type="datetimeFigureOut">
               <a:rPr lang="zh-CN" altLang="en-US" smtClean="0"/>
-              <a:t>2016/7/29</a:t>
+              <a:t>2016/7/30</a:t>
             </a:fld>
             <a:endParaRPr lang="zh-CN" altLang="en-US"/>
           </a:p>
@@ -1945,7 +1946,7 @@
           <a:p>
             <a:fld id="{530820CF-B880-4189-942D-D702A7CBA730}" type="datetimeFigureOut">
               <a:rPr lang="zh-CN" altLang="en-US" smtClean="0"/>
-              <a:t>2016/7/29</a:t>
+              <a:t>2016/7/30</a:t>
             </a:fld>
             <a:endParaRPr lang="zh-CN" altLang="en-US"/>
           </a:p>
@@ -2217,7 +2218,7 @@
           <a:p>
             <a:fld id="{530820CF-B880-4189-942D-D702A7CBA730}" type="datetimeFigureOut">
               <a:rPr lang="zh-CN" altLang="en-US" smtClean="0"/>
-              <a:t>2016/7/29</a:t>
+              <a:t>2016/7/30</a:t>
             </a:fld>
             <a:endParaRPr lang="zh-CN" altLang="en-US"/>
           </a:p>
@@ -2465,7 +2466,7 @@
           <a:p>
             <a:fld id="{530820CF-B880-4189-942D-D702A7CBA730}" type="datetimeFigureOut">
               <a:rPr lang="zh-CN" altLang="en-US" smtClean="0"/>
-              <a:t>2016/7/29</a:t>
+              <a:t>2016/7/30</a:t>
             </a:fld>
             <a:endParaRPr lang="zh-CN" altLang="en-US"/>
           </a:p>
@@ -2673,7 +2674,7 @@
           <a:p>
             <a:fld id="{530820CF-B880-4189-942D-D702A7CBA730}" type="datetimeFigureOut">
               <a:rPr lang="zh-CN" altLang="en-US" smtClean="0"/>
-              <a:t>2016/7/29</a:t>
+              <a:t>2016/7/30</a:t>
             </a:fld>
             <a:endParaRPr lang="zh-CN" altLang="en-US"/>
           </a:p>
@@ -3079,6 +3080,68 @@
 </p:sld>
 </file>
 
+<file path=ppt/slides/slide10.xml><?xml version="1.0" encoding="utf-8"?>
+<p:sld xmlns:a="http://schemas.openxmlformats.org/drawingml/2006/main" xmlns:r="http://schemas.openxmlformats.org/officeDocument/2006/relationships" xmlns:p="http://schemas.openxmlformats.org/presentationml/2006/main">
+  <p:cSld>
+    <p:spTree>
+      <p:nvGrpSpPr>
+        <p:cNvPr id="1" name=""/>
+        <p:cNvGrpSpPr/>
+        <p:nvPr/>
+      </p:nvGrpSpPr>
+      <p:grpSpPr>
+        <a:xfrm>
+          <a:off x="0" y="0"/>
+          <a:ext cx="0" cy="0"/>
+          <a:chOff x="0" y="0"/>
+          <a:chExt cx="0" cy="0"/>
+        </a:xfrm>
+      </p:grpSpPr>
+      <p:sp>
+        <p:nvSpPr>
+          <p:cNvPr id="2" name="标题 1"/>
+          <p:cNvSpPr>
+            <a:spLocks noGrp="1"/>
+          </p:cNvSpPr>
+          <p:nvPr>
+            <p:ph type="title"/>
+          </p:nvPr>
+        </p:nvSpPr>
+        <p:spPr>
+          <a:xfrm>
+            <a:off x="467544" y="2636912"/>
+            <a:ext cx="8229600" cy="1143000"/>
+          </a:xfrm>
+        </p:spPr>
+        <p:txBody>
+          <a:bodyPr/>
+          <a:lstStyle/>
+          <a:p>
+            <a:r>
+              <a:rPr lang="en-US" altLang="zh-CN" dirty="0" smtClean="0"/>
+              <a:t>Thanks, by </a:t>
+            </a:r>
+            <a:r>
+              <a:rPr lang="en-US" altLang="zh-CN" dirty="0" err="1" smtClean="0"/>
+              <a:t>Aario</a:t>
+            </a:r>
+            <a:endParaRPr lang="zh-CN" altLang="en-US" dirty="0"/>
+          </a:p>
+        </p:txBody>
+      </p:sp>
+    </p:spTree>
+    <p:extLst>
+      <p:ext uri="{BB962C8B-B14F-4D97-AF65-F5344CB8AC3E}">
+        <p14:creationId xmlns:p14="http://schemas.microsoft.com/office/powerpoint/2010/main" val="1047254095"/>
+      </p:ext>
+    </p:extLst>
+  </p:cSld>
+  <p:clrMapOvr>
+    <a:masterClrMapping/>
+  </p:clrMapOvr>
+</p:sld>
+</file>
+
 <file path=ppt/slides/slide2.xml><?xml version="1.0" encoding="utf-8"?>
 <p:sld xmlns:a="http://schemas.openxmlformats.org/drawingml/2006/main" xmlns:r="http://schemas.openxmlformats.org/officeDocument/2006/relationships" xmlns:p="http://schemas.openxmlformats.org/presentationml/2006/main">
   <p:cSld>
@@ -3364,6 +3427,363 @@
 </file>
 
 <file path=ppt/slides/slide3.xml><?xml version="1.0" encoding="utf-8"?>
+<p:sld xmlns:a="http://schemas.openxmlformats.org/drawingml/2006/main" xmlns:r="http://schemas.openxmlformats.org/officeDocument/2006/relationships" xmlns:p="http://schemas.openxmlformats.org/presentationml/2006/main">
+  <p:cSld>
+    <p:spTree>
+      <p:nvGrpSpPr>
+        <p:cNvPr id="1" name=""/>
+        <p:cNvGrpSpPr/>
+        <p:nvPr/>
+      </p:nvGrpSpPr>
+      <p:grpSpPr>
+        <a:xfrm>
+          <a:off x="0" y="0"/>
+          <a:ext cx="0" cy="0"/>
+          <a:chOff x="0" y="0"/>
+          <a:chExt cx="0" cy="0"/>
+        </a:xfrm>
+      </p:grpSpPr>
+      <p:sp>
+        <p:nvSpPr>
+          <p:cNvPr id="4" name="TextBox 3"/>
+          <p:cNvSpPr txBox="1"/>
+          <p:nvPr/>
+        </p:nvSpPr>
+        <p:spPr>
+          <a:xfrm>
+            <a:off x="647564" y="615798"/>
+            <a:ext cx="6228692" cy="6186309"/>
+          </a:xfrm>
+          <a:prstGeom prst="rect">
+            <a:avLst/>
+          </a:prstGeom>
+          <a:noFill/>
+        </p:spPr>
+        <p:txBody>
+          <a:bodyPr wrap="square" rtlCol="0">
+            <a:spAutoFit/>
+          </a:bodyPr>
+          <a:lstStyle/>
+          <a:p>
+            <a:r>
+              <a:rPr lang="en-US" altLang="zh-CN" b="1" dirty="0" smtClean="0">
+                <a:latin typeface="等线 Light" pitchFamily="2" charset="-122"/>
+                <a:ea typeface="等线 Light" pitchFamily="2" charset="-122"/>
+              </a:rPr>
+              <a:t>[load testing]</a:t>
+            </a:r>
+          </a:p>
+          <a:p>
+            <a:r>
+              <a:rPr lang="en-US" altLang="zh-CN" dirty="0" err="1" smtClean="0">
+                <a:latin typeface="等线 Light" pitchFamily="2" charset="-122"/>
+                <a:ea typeface="等线 Light" pitchFamily="2" charset="-122"/>
+                <a:hlinkClick r:id="rId2"/>
+              </a:rPr>
+              <a:t>http_load</a:t>
+            </a:r>
+            <a:r>
+              <a:rPr lang="en-US" altLang="zh-CN" dirty="0" smtClean="0">
+                <a:latin typeface="等线 Light" pitchFamily="2" charset="-122"/>
+                <a:ea typeface="等线 Light" pitchFamily="2" charset="-122"/>
+                <a:hlinkClick r:id="rId2"/>
+              </a:rPr>
+              <a:t> </a:t>
+            </a:r>
+            <a:r>
+              <a:rPr lang="en-US" altLang="zh-CN" dirty="0" smtClean="0">
+                <a:latin typeface="等线 Light" pitchFamily="2" charset="-122"/>
+                <a:ea typeface="等线 Light" pitchFamily="2" charset="-122"/>
+              </a:rPr>
+              <a:t>: runs in single process(won’t bog </a:t>
+            </a:r>
+            <a:r>
+              <a:rPr lang="en-US" altLang="zh-CN" dirty="0">
+                <a:latin typeface="等线 Light" pitchFamily="2" charset="-122"/>
+                <a:ea typeface="等线 Light" pitchFamily="2" charset="-122"/>
+              </a:rPr>
+              <a:t>down the client </a:t>
+            </a:r>
+            <a:r>
+              <a:rPr lang="en-US" altLang="zh-CN" dirty="0" smtClean="0">
+                <a:latin typeface="等线 Light" pitchFamily="2" charset="-122"/>
+                <a:ea typeface="等线 Light" pitchFamily="2" charset="-122"/>
+              </a:rPr>
+              <a:t>machine); can do HTTPS fetches.</a:t>
+            </a:r>
+          </a:p>
+          <a:p>
+            <a:r>
+              <a:rPr lang="en-US" altLang="zh-CN" dirty="0" smtClean="0">
+                <a:latin typeface="等线 Light" pitchFamily="2" charset="-122"/>
+                <a:ea typeface="等线 Light" pitchFamily="2" charset="-122"/>
+                <a:hlinkClick r:id="rId3"/>
+              </a:rPr>
+              <a:t>Apache </a:t>
+            </a:r>
+            <a:r>
+              <a:rPr lang="en-US" altLang="zh-CN" dirty="0" err="1" smtClean="0">
+                <a:latin typeface="等线 Light" pitchFamily="2" charset="-122"/>
+                <a:ea typeface="等线 Light" pitchFamily="2" charset="-122"/>
+                <a:hlinkClick r:id="rId3"/>
+              </a:rPr>
+              <a:t>ab</a:t>
+            </a:r>
+            <a:endParaRPr lang="en-US" altLang="zh-CN" dirty="0" smtClean="0">
+              <a:latin typeface="等线 Light" pitchFamily="2" charset="-122"/>
+              <a:ea typeface="等线 Light" pitchFamily="2" charset="-122"/>
+            </a:endParaRPr>
+          </a:p>
+          <a:p>
+            <a:r>
+              <a:rPr lang="en-US" altLang="zh-CN" dirty="0" err="1" smtClean="0">
+                <a:latin typeface="等线 Light" pitchFamily="2" charset="-122"/>
+                <a:ea typeface="等线 Light" pitchFamily="2" charset="-122"/>
+                <a:hlinkClick r:id="rId4"/>
+              </a:rPr>
+              <a:t>Fwptt</a:t>
+            </a:r>
+            <a:r>
+              <a:rPr lang="en-US" altLang="zh-CN" dirty="0" smtClean="0">
+                <a:latin typeface="等线 Light" pitchFamily="2" charset="-122"/>
+                <a:ea typeface="等线 Light" pitchFamily="2" charset="-122"/>
+              </a:rPr>
+              <a:t>  can do Ajax fetches</a:t>
+            </a:r>
+          </a:p>
+          <a:p>
+            <a:r>
+              <a:rPr lang="en-US" altLang="zh-CN" dirty="0" err="1">
+                <a:latin typeface="等线 Light" pitchFamily="2" charset="-122"/>
+                <a:ea typeface="等线 Light" pitchFamily="2" charset="-122"/>
+                <a:hlinkClick r:id="rId5"/>
+              </a:rPr>
+              <a:t>JCrawler</a:t>
+            </a:r>
+            <a:r>
+              <a:rPr lang="en-US" altLang="zh-CN" dirty="0">
+                <a:latin typeface="等线 Light" pitchFamily="2" charset="-122"/>
+                <a:ea typeface="等线 Light" pitchFamily="2" charset="-122"/>
+              </a:rPr>
+              <a:t> </a:t>
+            </a:r>
+            <a:r>
+              <a:rPr lang="en-US" altLang="zh-CN" dirty="0" smtClean="0">
+                <a:latin typeface="等线 Light" pitchFamily="2" charset="-122"/>
+                <a:ea typeface="等线 Light" pitchFamily="2" charset="-122"/>
+              </a:rPr>
+              <a:t> :  You </a:t>
+            </a:r>
+            <a:r>
+              <a:rPr lang="en-US" altLang="zh-CN" dirty="0">
+                <a:latin typeface="等线 Light" pitchFamily="2" charset="-122"/>
+                <a:ea typeface="等线 Light" pitchFamily="2" charset="-122"/>
+              </a:rPr>
+              <a:t>can give </a:t>
+            </a:r>
+            <a:r>
+              <a:rPr lang="en-US" altLang="zh-CN" dirty="0" err="1">
+                <a:latin typeface="等线 Light" pitchFamily="2" charset="-122"/>
+                <a:ea typeface="等线 Light" pitchFamily="2" charset="-122"/>
+              </a:rPr>
+              <a:t>JCrawler</a:t>
+            </a:r>
+            <a:r>
+              <a:rPr lang="en-US" altLang="zh-CN" dirty="0">
+                <a:latin typeface="等线 Light" pitchFamily="2" charset="-122"/>
+                <a:ea typeface="等线 Light" pitchFamily="2" charset="-122"/>
+              </a:rPr>
+              <a:t> a set of starting URLs and it will begin crawling from that point onwards, going through any URLs it can find on its way and generating load on the web application.</a:t>
+            </a:r>
+            <a:endParaRPr lang="en-US" altLang="zh-CN" dirty="0" smtClean="0">
+              <a:latin typeface="等线 Light" pitchFamily="2" charset="-122"/>
+              <a:ea typeface="等线 Light" pitchFamily="2" charset="-122"/>
+            </a:endParaRPr>
+          </a:p>
+          <a:p>
+            <a:endParaRPr lang="en-US" altLang="zh-CN" dirty="0" smtClean="0">
+              <a:latin typeface="等线 Light" pitchFamily="2" charset="-122"/>
+              <a:ea typeface="等线 Light" pitchFamily="2" charset="-122"/>
+            </a:endParaRPr>
+          </a:p>
+          <a:p>
+            <a:r>
+              <a:rPr lang="en-US" altLang="zh-CN" dirty="0" err="1" smtClean="0">
+                <a:latin typeface="等线 Light" pitchFamily="2" charset="-122"/>
+                <a:ea typeface="等线 Light" pitchFamily="2" charset="-122"/>
+                <a:hlinkClick r:id="rId6"/>
+              </a:rPr>
+              <a:t>Jmeter</a:t>
+            </a:r>
+            <a:r>
+              <a:rPr lang="en-US" altLang="zh-CN" dirty="0" smtClean="0">
+                <a:latin typeface="等线 Light" pitchFamily="2" charset="-122"/>
+                <a:ea typeface="等线 Light" pitchFamily="2" charset="-122"/>
+                <a:hlinkClick r:id="rId6"/>
+              </a:rPr>
+              <a:t> </a:t>
+            </a:r>
+            <a:r>
+              <a:rPr lang="en-US" altLang="zh-CN" dirty="0" smtClean="0">
+                <a:latin typeface="等线 Light" pitchFamily="2" charset="-122"/>
+                <a:ea typeface="等线 Light" pitchFamily="2" charset="-122"/>
+              </a:rPr>
+              <a:t>: </a:t>
+            </a:r>
+          </a:p>
+          <a:p>
+            <a:endParaRPr lang="en-US" altLang="zh-CN" dirty="0" smtClean="0">
+              <a:latin typeface="等线 Light" pitchFamily="2" charset="-122"/>
+              <a:ea typeface="等线 Light" pitchFamily="2" charset="-122"/>
+            </a:endParaRPr>
+          </a:p>
+          <a:p>
+            <a:endParaRPr lang="en-US" altLang="zh-CN" dirty="0" smtClean="0">
+              <a:latin typeface="等线 Light" pitchFamily="2" charset="-122"/>
+              <a:ea typeface="等线 Light" pitchFamily="2" charset="-122"/>
+            </a:endParaRPr>
+          </a:p>
+          <a:p>
+            <a:r>
+              <a:rPr lang="en-US" altLang="zh-CN" dirty="0" smtClean="0">
+                <a:latin typeface="等线 Light" pitchFamily="2" charset="-122"/>
+                <a:ea typeface="等线 Light" pitchFamily="2" charset="-122"/>
+                <a:hlinkClick r:id="rId7"/>
+              </a:rPr>
+              <a:t>Web Polygraph</a:t>
+            </a:r>
+            <a:r>
+              <a:rPr lang="en-US" altLang="zh-CN" dirty="0" smtClean="0">
+                <a:latin typeface="等线 Light" pitchFamily="2" charset="-122"/>
+                <a:ea typeface="等线 Light" pitchFamily="2" charset="-122"/>
+              </a:rPr>
+              <a:t> </a:t>
+            </a:r>
+            <a:r>
+              <a:rPr lang="en-US" altLang="zh-CN" dirty="0">
+                <a:latin typeface="等线 Light" pitchFamily="2" charset="-122"/>
+                <a:ea typeface="等线 Light" pitchFamily="2" charset="-122"/>
+              </a:rPr>
+              <a:t>HTTP and SOCKS5 proxy support</a:t>
+            </a:r>
+            <a:endParaRPr lang="en-US" altLang="zh-CN" dirty="0" smtClean="0">
+              <a:latin typeface="等线 Light" pitchFamily="2" charset="-122"/>
+              <a:ea typeface="等线 Light" pitchFamily="2" charset="-122"/>
+            </a:endParaRPr>
+          </a:p>
+          <a:p>
+            <a:endParaRPr lang="en-US" altLang="zh-CN" dirty="0" smtClean="0">
+              <a:latin typeface="等线 Light" pitchFamily="2" charset="-122"/>
+              <a:ea typeface="等线 Light" pitchFamily="2" charset="-122"/>
+            </a:endParaRPr>
+          </a:p>
+          <a:p>
+            <a:r>
+              <a:rPr lang="en-US" altLang="zh-CN" b="1" dirty="0">
+                <a:latin typeface="等线 Light" pitchFamily="2" charset="-122"/>
+                <a:ea typeface="等线 Light" pitchFamily="2" charset="-122"/>
+              </a:rPr>
+              <a:t>[</a:t>
+            </a:r>
+            <a:r>
+              <a:rPr lang="en-US" altLang="zh-CN" b="1" dirty="0" err="1">
+                <a:latin typeface="等线 Light" pitchFamily="2" charset="-122"/>
+                <a:ea typeface="等线 Light" pitchFamily="2" charset="-122"/>
+              </a:rPr>
+              <a:t>php</a:t>
+            </a:r>
+            <a:r>
+              <a:rPr lang="en-US" altLang="zh-CN" b="1" dirty="0">
+                <a:latin typeface="等线 Light" pitchFamily="2" charset="-122"/>
+                <a:ea typeface="等线 Light" pitchFamily="2" charset="-122"/>
+              </a:rPr>
+              <a:t>]</a:t>
+            </a:r>
+          </a:p>
+          <a:p>
+            <a:r>
+              <a:rPr lang="en-US" altLang="zh-CN" dirty="0" err="1" smtClean="0">
+                <a:latin typeface="等线 Light" pitchFamily="2" charset="-122"/>
+                <a:ea typeface="等线 Light" pitchFamily="2" charset="-122"/>
+              </a:rPr>
+              <a:t>Xhprof</a:t>
+            </a:r>
+            <a:endParaRPr lang="en-US" altLang="zh-CN" dirty="0">
+              <a:latin typeface="等线 Light" pitchFamily="2" charset="-122"/>
+              <a:ea typeface="等线 Light" pitchFamily="2" charset="-122"/>
+            </a:endParaRPr>
+          </a:p>
+          <a:p>
+            <a:endParaRPr lang="en-US" altLang="zh-CN" dirty="0" smtClean="0">
+              <a:latin typeface="等线 Light" pitchFamily="2" charset="-122"/>
+              <a:ea typeface="等线 Light" pitchFamily="2" charset="-122"/>
+            </a:endParaRPr>
+          </a:p>
+          <a:p>
+            <a:endParaRPr lang="en-US" altLang="zh-CN" dirty="0">
+              <a:latin typeface="等线 Light" pitchFamily="2" charset="-122"/>
+              <a:ea typeface="等线 Light" pitchFamily="2" charset="-122"/>
+            </a:endParaRPr>
+          </a:p>
+          <a:p>
+            <a:r>
+              <a:rPr lang="en-US" altLang="zh-CN" b="1" dirty="0" smtClean="0">
+                <a:latin typeface="等线 Light" pitchFamily="2" charset="-122"/>
+                <a:ea typeface="等线 Light" pitchFamily="2" charset="-122"/>
+              </a:rPr>
+              <a:t>[java]</a:t>
+            </a:r>
+          </a:p>
+          <a:p>
+            <a:r>
+              <a:rPr lang="en-US" altLang="zh-CN" dirty="0" smtClean="0">
+                <a:latin typeface="等线 Light" pitchFamily="2" charset="-122"/>
+                <a:ea typeface="等线 Light" pitchFamily="2" charset="-122"/>
+                <a:hlinkClick r:id="rId8"/>
+              </a:rPr>
+              <a:t>Grinder </a:t>
+            </a:r>
+            <a:r>
+              <a:rPr lang="en-US" altLang="zh-CN" dirty="0" smtClean="0">
+                <a:latin typeface="等线 Light" pitchFamily="2" charset="-122"/>
+                <a:ea typeface="等线 Light" pitchFamily="2" charset="-122"/>
+              </a:rPr>
+              <a:t>: testing Java </a:t>
+            </a:r>
+            <a:r>
+              <a:rPr lang="en-US" altLang="zh-CN" dirty="0" err="1" smtClean="0">
+                <a:latin typeface="等线 Light" pitchFamily="2" charset="-122"/>
+                <a:ea typeface="等线 Light" pitchFamily="2" charset="-122"/>
+              </a:rPr>
+              <a:t>jvm</a:t>
+            </a:r>
+            <a:endParaRPr lang="en-US" altLang="zh-CN" dirty="0" smtClean="0">
+              <a:latin typeface="等线 Light" pitchFamily="2" charset="-122"/>
+              <a:ea typeface="等线 Light" pitchFamily="2" charset="-122"/>
+            </a:endParaRPr>
+          </a:p>
+          <a:p>
+            <a:endParaRPr lang="en-US" altLang="zh-CN" dirty="0" smtClean="0">
+              <a:latin typeface="等线 Light" pitchFamily="2" charset="-122"/>
+              <a:ea typeface="等线 Light" pitchFamily="2" charset="-122"/>
+            </a:endParaRPr>
+          </a:p>
+        </p:txBody>
+      </p:sp>
+    </p:spTree>
+    <p:extLst>
+      <p:ext uri="{BB962C8B-B14F-4D97-AF65-F5344CB8AC3E}">
+        <p14:creationId xmlns:p14="http://schemas.microsoft.com/office/powerpoint/2010/main" val="2740910377"/>
+      </p:ext>
+    </p:extLst>
+  </p:cSld>
+  <p:clrMapOvr>
+    <a:masterClrMapping/>
+  </p:clrMapOvr>
+</p:sld>
+</file>
+
+<file path=ppt/slides/slide4.xml><?xml version="1.0" encoding="utf-8"?>
 <p:sld xmlns:a="http://schemas.openxmlformats.org/drawingml/2006/main" xmlns:r="http://schemas.openxmlformats.org/officeDocument/2006/relationships" xmlns:p="http://schemas.openxmlformats.org/presentationml/2006/main">
   <p:cSld>
     <p:spTree>
@@ -3744,7 +4164,7 @@
 </p:sld>
 </file>
 
-<file path=ppt/slides/slide4.xml><?xml version="1.0" encoding="utf-8"?>
+<file path=ppt/slides/slide5.xml><?xml version="1.0" encoding="utf-8"?>
 <p:sld xmlns:a="http://schemas.openxmlformats.org/drawingml/2006/main" xmlns:r="http://schemas.openxmlformats.org/officeDocument/2006/relationships" xmlns:p="http://schemas.openxmlformats.org/presentationml/2006/main">
   <p:cSld>
     <p:spTree>
@@ -3811,7 +4231,7 @@
         <p:spPr>
           <a:xfrm>
             <a:off x="755576" y="4040108"/>
-            <a:ext cx="3528392" cy="1538883"/>
+            <a:ext cx="3528392" cy="2154436"/>
           </a:xfrm>
           <a:prstGeom prst="rect">
             <a:avLst/>
@@ -3844,78 +4264,6 @@
             </a:r>
           </a:p>
           <a:p>
-            <a:r>
-              <a:rPr lang="en-US" altLang="zh-CN" sz="1000" dirty="0" smtClean="0">
-                <a:latin typeface="Microsoft Yi Baiti" pitchFamily="66" charset="0"/>
-                <a:ea typeface="Microsoft Yi Baiti" pitchFamily="66" charset="0"/>
-              </a:rPr>
-              <a:t># Open Slow Log</a:t>
-            </a:r>
-          </a:p>
-          <a:p>
-            <a:r>
-              <a:rPr lang="en-US" altLang="zh-CN" sz="1000" dirty="0" err="1">
-                <a:latin typeface="Microsoft Yi Baiti" pitchFamily="66" charset="0"/>
-                <a:ea typeface="Microsoft Yi Baiti" pitchFamily="66" charset="0"/>
-              </a:rPr>
-              <a:t>slowlog</a:t>
-            </a:r>
-            <a:r>
-              <a:rPr lang="en-US" altLang="zh-CN" sz="1000" dirty="0">
-                <a:latin typeface="Microsoft Yi Baiti" pitchFamily="66" charset="0"/>
-                <a:ea typeface="Microsoft Yi Baiti" pitchFamily="66" charset="0"/>
-              </a:rPr>
-              <a:t> = /</a:t>
-            </a:r>
-            <a:r>
-              <a:rPr lang="en-US" altLang="zh-CN" sz="1000" dirty="0" err="1" smtClean="0">
-                <a:latin typeface="Microsoft Yi Baiti" pitchFamily="66" charset="0"/>
-                <a:ea typeface="Microsoft Yi Baiti" pitchFamily="66" charset="0"/>
-              </a:rPr>
-              <a:t>var</a:t>
-            </a:r>
-            <a:r>
-              <a:rPr lang="en-US" altLang="zh-CN" sz="1000" dirty="0" smtClean="0">
-                <a:latin typeface="Microsoft Yi Baiti" pitchFamily="66" charset="0"/>
-                <a:ea typeface="Microsoft Yi Baiti" pitchFamily="66" charset="0"/>
-              </a:rPr>
-              <a:t>/log/</a:t>
-            </a:r>
-            <a:r>
-              <a:rPr lang="en-US" altLang="zh-CN" sz="1000" dirty="0" err="1" smtClean="0">
-                <a:latin typeface="Microsoft Yi Baiti" pitchFamily="66" charset="0"/>
-                <a:ea typeface="Microsoft Yi Baiti" pitchFamily="66" charset="0"/>
-              </a:rPr>
-              <a:t>php</a:t>
-            </a:r>
-            <a:r>
-              <a:rPr lang="en-US" altLang="zh-CN" sz="1000" dirty="0" smtClean="0">
-                <a:latin typeface="Microsoft Yi Baiti" pitchFamily="66" charset="0"/>
-                <a:ea typeface="Microsoft Yi Baiti" pitchFamily="66" charset="0"/>
-              </a:rPr>
-              <a:t>/</a:t>
-            </a:r>
-            <a:r>
-              <a:rPr lang="en-US" altLang="zh-CN" sz="1000" dirty="0" err="1" smtClean="0">
-                <a:latin typeface="Microsoft Yi Baiti" pitchFamily="66" charset="0"/>
-                <a:ea typeface="Microsoft Yi Baiti" pitchFamily="66" charset="0"/>
-              </a:rPr>
-              <a:t>php</a:t>
-            </a:r>
-            <a:r>
-              <a:rPr lang="en-US" altLang="zh-CN" sz="1000" dirty="0" smtClean="0">
-                <a:latin typeface="Microsoft Yi Baiti" pitchFamily="66" charset="0"/>
-                <a:ea typeface="Microsoft Yi Baiti" pitchFamily="66" charset="0"/>
-              </a:rPr>
-              <a:t>-fpm-$</a:t>
-            </a:r>
-            <a:r>
-              <a:rPr lang="en-US" altLang="zh-CN" sz="1000" dirty="0" err="1" smtClean="0">
-                <a:latin typeface="Microsoft Yi Baiti" pitchFamily="66" charset="0"/>
-                <a:ea typeface="Microsoft Yi Baiti" pitchFamily="66" charset="0"/>
-              </a:rPr>
-              <a:t>pool.slow</a:t>
-            </a:r>
             <a:endParaRPr lang="en-US" altLang="zh-CN" sz="1000" dirty="0">
               <a:latin typeface="Microsoft Yi Baiti" pitchFamily="66" charset="0"/>
               <a:ea typeface="Microsoft Yi Baiti" pitchFamily="66" charset="0"/>
@@ -3923,28 +4271,86 @@
           </a:p>
           <a:p>
             <a:r>
-              <a:rPr lang="en-US" altLang="zh-CN" sz="1000" dirty="0" err="1">
-                <a:latin typeface="Microsoft Yi Baiti" pitchFamily="66" charset="0"/>
-                <a:ea typeface="Microsoft Yi Baiti" pitchFamily="66" charset="0"/>
-              </a:rPr>
-              <a:t>request_slowlog_timeout</a:t>
-            </a:r>
-            <a:r>
-              <a:rPr lang="en-US" altLang="zh-CN" sz="1000" dirty="0">
-                <a:latin typeface="Microsoft Yi Baiti" pitchFamily="66" charset="0"/>
-                <a:ea typeface="Microsoft Yi Baiti" pitchFamily="66" charset="0"/>
-              </a:rPr>
-              <a:t> = </a:t>
-            </a:r>
-            <a:r>
               <a:rPr lang="en-US" altLang="zh-CN" sz="1000" dirty="0" smtClean="0">
                 <a:latin typeface="Microsoft Yi Baiti" pitchFamily="66" charset="0"/>
                 <a:ea typeface="Microsoft Yi Baiti" pitchFamily="66" charset="0"/>
               </a:rPr>
-              <a:t>2s</a:t>
-            </a:r>
-          </a:p>
-          <a:p>
+              <a:t>[www]</a:t>
+            </a:r>
+          </a:p>
+          <a:p>
+            <a:r>
+              <a:rPr lang="en-US" altLang="zh-CN" sz="1000" dirty="0" smtClean="0">
+                <a:latin typeface="Microsoft Yi Baiti" pitchFamily="66" charset="0"/>
+                <a:ea typeface="Microsoft Yi Baiti" pitchFamily="66" charset="0"/>
+              </a:rPr>
+              <a:t># Open Slow Log</a:t>
+            </a:r>
+          </a:p>
+          <a:p>
+            <a:r>
+              <a:rPr lang="en-US" altLang="zh-CN" sz="1000" dirty="0" err="1" smtClean="0">
+                <a:latin typeface="Microsoft Yi Baiti" pitchFamily="66" charset="0"/>
+                <a:ea typeface="Microsoft Yi Baiti" pitchFamily="66" charset="0"/>
+              </a:rPr>
+              <a:t>slowlog</a:t>
+            </a:r>
+            <a:r>
+              <a:rPr lang="en-US" altLang="zh-CN" sz="1000" dirty="0" smtClean="0">
+                <a:latin typeface="Microsoft Yi Baiti" pitchFamily="66" charset="0"/>
+                <a:ea typeface="Microsoft Yi Baiti" pitchFamily="66" charset="0"/>
+              </a:rPr>
+              <a:t> = /</a:t>
+            </a:r>
+            <a:r>
+              <a:rPr lang="en-US" altLang="zh-CN" sz="1000" dirty="0" err="1" smtClean="0">
+                <a:latin typeface="Microsoft Yi Baiti" pitchFamily="66" charset="0"/>
+                <a:ea typeface="Microsoft Yi Baiti" pitchFamily="66" charset="0"/>
+              </a:rPr>
+              <a:t>var</a:t>
+            </a:r>
+            <a:r>
+              <a:rPr lang="en-US" altLang="zh-CN" sz="1000" dirty="0" smtClean="0">
+                <a:latin typeface="Microsoft Yi Baiti" pitchFamily="66" charset="0"/>
+                <a:ea typeface="Microsoft Yi Baiti" pitchFamily="66" charset="0"/>
+              </a:rPr>
+              <a:t>/log/</a:t>
+            </a:r>
+            <a:r>
+              <a:rPr lang="en-US" altLang="zh-CN" sz="1000" dirty="0" err="1" smtClean="0">
+                <a:latin typeface="Microsoft Yi Baiti" pitchFamily="66" charset="0"/>
+                <a:ea typeface="Microsoft Yi Baiti" pitchFamily="66" charset="0"/>
+              </a:rPr>
+              <a:t>php</a:t>
+            </a:r>
+            <a:r>
+              <a:rPr lang="en-US" altLang="zh-CN" sz="1000" dirty="0" smtClean="0">
+                <a:latin typeface="Microsoft Yi Baiti" pitchFamily="66" charset="0"/>
+                <a:ea typeface="Microsoft Yi Baiti" pitchFamily="66" charset="0"/>
+              </a:rPr>
+              <a:t>/</a:t>
+            </a:r>
+            <a:r>
+              <a:rPr lang="en-US" altLang="zh-CN" sz="1000" dirty="0" err="1" smtClean="0">
+                <a:latin typeface="Microsoft Yi Baiti" pitchFamily="66" charset="0"/>
+                <a:ea typeface="Microsoft Yi Baiti" pitchFamily="66" charset="0"/>
+              </a:rPr>
+              <a:t>php</a:t>
+            </a:r>
+            <a:r>
+              <a:rPr lang="en-US" altLang="zh-CN" sz="1000" dirty="0" smtClean="0">
+                <a:latin typeface="Microsoft Yi Baiti" pitchFamily="66" charset="0"/>
+                <a:ea typeface="Microsoft Yi Baiti" pitchFamily="66" charset="0"/>
+              </a:rPr>
+              <a:t>-fpm-$</a:t>
+            </a:r>
+            <a:r>
+              <a:rPr lang="en-US" altLang="zh-CN" sz="1000" dirty="0" err="1" smtClean="0">
+                <a:latin typeface="Microsoft Yi Baiti" pitchFamily="66" charset="0"/>
+                <a:ea typeface="Microsoft Yi Baiti" pitchFamily="66" charset="0"/>
+              </a:rPr>
+              <a:t>pool.slow</a:t>
+            </a:r>
             <a:endParaRPr lang="en-US" altLang="zh-CN" sz="1000" dirty="0" smtClean="0">
               <a:latin typeface="Microsoft Yi Baiti" pitchFamily="66" charset="0"/>
               <a:ea typeface="Microsoft Yi Baiti" pitchFamily="66" charset="0"/>
@@ -3952,6 +4358,44 @@
           </a:p>
           <a:p>
             <a:r>
+              <a:rPr lang="en-US" altLang="zh-CN" sz="1000" dirty="0" err="1" smtClean="0">
+                <a:latin typeface="Microsoft Yi Baiti" pitchFamily="66" charset="0"/>
+                <a:ea typeface="Microsoft Yi Baiti" pitchFamily="66" charset="0"/>
+              </a:rPr>
+              <a:t>request_slowlog_timeout</a:t>
+            </a:r>
+            <a:r>
+              <a:rPr lang="en-US" altLang="zh-CN" sz="1000" dirty="0" smtClean="0">
+                <a:latin typeface="Microsoft Yi Baiti" pitchFamily="66" charset="0"/>
+                <a:ea typeface="Microsoft Yi Baiti" pitchFamily="66" charset="0"/>
+              </a:rPr>
+              <a:t> = 2s</a:t>
+            </a:r>
+          </a:p>
+          <a:p>
+            <a:r>
+              <a:rPr lang="en-US" altLang="zh-CN" sz="1000" dirty="0" err="1" smtClean="0">
+                <a:latin typeface="Microsoft Yi Baiti" pitchFamily="66" charset="0"/>
+                <a:ea typeface="Microsoft Yi Baiti" pitchFamily="66" charset="0"/>
+              </a:rPr>
+              <a:t>request_terminate_timeout</a:t>
+            </a:r>
+            <a:r>
+              <a:rPr lang="en-US" altLang="zh-CN" sz="1000" dirty="0" smtClean="0">
+                <a:latin typeface="Microsoft Yi Baiti" pitchFamily="66" charset="0"/>
+                <a:ea typeface="Microsoft Yi Baiti" pitchFamily="66" charset="0"/>
+              </a:rPr>
+              <a:t> = 10s</a:t>
+            </a:r>
+          </a:p>
+          <a:p>
+            <a:endParaRPr lang="en-US" altLang="zh-CN" sz="1000" dirty="0" smtClean="0">
+              <a:latin typeface="Microsoft Yi Baiti" pitchFamily="66" charset="0"/>
+              <a:ea typeface="Microsoft Yi Baiti" pitchFamily="66" charset="0"/>
+            </a:endParaRPr>
+          </a:p>
+          <a:p>
+            <a:r>
               <a:rPr lang="en-US" altLang="zh-CN" sz="1000" dirty="0" smtClean="0">
                 <a:latin typeface="Microsoft Yi Baiti" pitchFamily="66" charset="0"/>
                 <a:ea typeface="Microsoft Yi Baiti" pitchFamily="66" charset="0"/>
@@ -4006,7 +4450,7 @@
                 <a:latin typeface="Microsoft Yi Baiti" pitchFamily="66" charset="0"/>
                 <a:ea typeface="Microsoft Yi Baiti" pitchFamily="66" charset="0"/>
               </a:rPr>
-              <a:t>4    # to the number of the cores of the CPU</a:t>
+              <a:t>4    # to the number of the cores of the CPU, then check the idle of the CPU to increase the number</a:t>
             </a:r>
             <a:endParaRPr lang="zh-CN" altLang="en-US" sz="1000" dirty="0">
               <a:latin typeface="Microsoft Yi Baiti" pitchFamily="66" charset="0"/>
@@ -4690,7 +5134,7 @@
 </p:sld>
 </file>
 
-<file path=ppt/slides/slide5.xml><?xml version="1.0" encoding="utf-8"?>
+<file path=ppt/slides/slide6.xml><?xml version="1.0" encoding="utf-8"?>
 <p:sld xmlns:a="http://schemas.openxmlformats.org/drawingml/2006/main" xmlns:r="http://schemas.openxmlformats.org/officeDocument/2006/relationships" xmlns:p="http://schemas.openxmlformats.org/presentationml/2006/main">
   <p:cSld>
     <p:spTree>
@@ -5276,7 +5720,7 @@
 </p:sld>
 </file>
 
-<file path=ppt/slides/slide6.xml><?xml version="1.0" encoding="utf-8"?>
+<file path=ppt/slides/slide7.xml><?xml version="1.0" encoding="utf-8"?>
 <p:sld xmlns:a="http://schemas.openxmlformats.org/drawingml/2006/main" xmlns:r="http://schemas.openxmlformats.org/officeDocument/2006/relationships" xmlns:p="http://schemas.openxmlformats.org/presentationml/2006/main">
   <p:cSld>
     <p:spTree>
@@ -5347,7 +5791,7 @@
 </p:sld>
 </file>
 
-<file path=ppt/slides/slide7.xml><?xml version="1.0" encoding="utf-8"?>
+<file path=ppt/slides/slide8.xml><?xml version="1.0" encoding="utf-8"?>
 <p:sld xmlns:a="http://schemas.openxmlformats.org/drawingml/2006/main" xmlns:r="http://schemas.openxmlformats.org/officeDocument/2006/relationships" xmlns:p="http://schemas.openxmlformats.org/presentationml/2006/main">
   <p:cSld>
     <p:spTree>
@@ -5418,7 +5862,7 @@
 </p:sld>
 </file>
 
-<file path=ppt/slides/slide8.xml><?xml version="1.0" encoding="utf-8"?>
+<file path=ppt/slides/slide9.xml><?xml version="1.0" encoding="utf-8"?>
 <p:sld xmlns:a="http://schemas.openxmlformats.org/drawingml/2006/main" xmlns:r="http://schemas.openxmlformats.org/officeDocument/2006/relationships" xmlns:p="http://schemas.openxmlformats.org/presentationml/2006/main">
   <p:cSld>
     <p:spTree>
@@ -5519,68 +5963,6 @@
     <p:extLst>
       <p:ext uri="{BB962C8B-B14F-4D97-AF65-F5344CB8AC3E}">
         <p14:creationId xmlns:p14="http://schemas.microsoft.com/office/powerpoint/2010/main" val="1609459488"/>
-      </p:ext>
-    </p:extLst>
-  </p:cSld>
-  <p:clrMapOvr>
-    <a:masterClrMapping/>
-  </p:clrMapOvr>
-</p:sld>
-</file>
-
-<file path=ppt/slides/slide9.xml><?xml version="1.0" encoding="utf-8"?>
-<p:sld xmlns:a="http://schemas.openxmlformats.org/drawingml/2006/main" xmlns:r="http://schemas.openxmlformats.org/officeDocument/2006/relationships" xmlns:p="http://schemas.openxmlformats.org/presentationml/2006/main">
-  <p:cSld>
-    <p:spTree>
-      <p:nvGrpSpPr>
-        <p:cNvPr id="1" name=""/>
-        <p:cNvGrpSpPr/>
-        <p:nvPr/>
-      </p:nvGrpSpPr>
-      <p:grpSpPr>
-        <a:xfrm>
-          <a:off x="0" y="0"/>
-          <a:ext cx="0" cy="0"/>
-          <a:chOff x="0" y="0"/>
-          <a:chExt cx="0" cy="0"/>
-        </a:xfrm>
-      </p:grpSpPr>
-      <p:sp>
-        <p:nvSpPr>
-          <p:cNvPr id="2" name="标题 1"/>
-          <p:cNvSpPr>
-            <a:spLocks noGrp="1"/>
-          </p:cNvSpPr>
-          <p:nvPr>
-            <p:ph type="title"/>
-          </p:nvPr>
-        </p:nvSpPr>
-        <p:spPr>
-          <a:xfrm>
-            <a:off x="467544" y="2636912"/>
-            <a:ext cx="8229600" cy="1143000"/>
-          </a:xfrm>
-        </p:spPr>
-        <p:txBody>
-          <a:bodyPr/>
-          <a:lstStyle/>
-          <a:p>
-            <a:r>
-              <a:rPr lang="en-US" altLang="zh-CN" dirty="0" smtClean="0"/>
-              <a:t>Thanks, by </a:t>
-            </a:r>
-            <a:r>
-              <a:rPr lang="en-US" altLang="zh-CN" dirty="0" err="1" smtClean="0"/>
-              <a:t>Aario</a:t>
-            </a:r>
-            <a:endParaRPr lang="zh-CN" altLang="en-US" dirty="0"/>
-          </a:p>
-        </p:txBody>
-      </p:sp>
-    </p:spTree>
-    <p:extLst>
-      <p:ext uri="{BB962C8B-B14F-4D97-AF65-F5344CB8AC3E}">
-        <p14:creationId xmlns:p14="http://schemas.microsoft.com/office/powerpoint/2010/main" val="1047254095"/>
       </p:ext>
     </p:extLst>
   </p:cSld>

</xml_diff>